<commit_message>
Präsentation so ziemlich fertig
</commit_message>
<xml_diff>
--- a/Präsentationen/PP_notenbonus.pptx
+++ b/Präsentationen/PP_notenbonus.pptx
@@ -10,10 +10,10 @@
     <p:sldMasterId id="2147483697" r:id="rId6"/>
   </p:sldMasterIdLst>
   <p:notesMasterIdLst>
-    <p:notesMasterId r:id="rId21"/>
+    <p:notesMasterId r:id="rId20"/>
   </p:notesMasterIdLst>
   <p:handoutMasterIdLst>
-    <p:handoutMasterId r:id="rId22"/>
+    <p:handoutMasterId r:id="rId21"/>
   </p:handoutMasterIdLst>
   <p:sldIdLst>
     <p:sldId id="356" r:id="rId7"/>
@@ -21,20 +21,19 @@
     <p:sldId id="379" r:id="rId9"/>
     <p:sldId id="380" r:id="rId10"/>
     <p:sldId id="381" r:id="rId11"/>
-    <p:sldId id="371" r:id="rId12"/>
+    <p:sldId id="382" r:id="rId12"/>
     <p:sldId id="376" r:id="rId13"/>
     <p:sldId id="375" r:id="rId14"/>
     <p:sldId id="374" r:id="rId15"/>
     <p:sldId id="370" r:id="rId16"/>
     <p:sldId id="372" r:id="rId17"/>
     <p:sldId id="373" r:id="rId18"/>
-    <p:sldId id="377" r:id="rId19"/>
-    <p:sldId id="279" r:id="rId20"/>
+    <p:sldId id="279" r:id="rId19"/>
   </p:sldIdLst>
   <p:sldSz cx="9144000" cy="5143500" type="screen16x9"/>
   <p:notesSz cx="9925050" cy="6665913"/>
   <p:custDataLst>
-    <p:tags r:id="rId23"/>
+    <p:tags r:id="rId22"/>
   </p:custDataLst>
   <p:defaultTextStyle>
     <a:defPPr>
@@ -1414,6 +1413,101 @@
               <a:pPr>
                 <a:defRPr/>
               </a:pPr>
+              <a:t>6</a:t>
+            </a:fld>
+            <a:endParaRPr lang="en-GB"/>
+          </a:p>
+        </p:txBody>
+      </p:sp>
+    </p:spTree>
+    <p:extLst>
+      <p:ext uri="{BB962C8B-B14F-4D97-AF65-F5344CB8AC3E}">
+        <p14:creationId xmlns:p14="http://schemas.microsoft.com/office/powerpoint/2010/main" val="1408043966"/>
+      </p:ext>
+    </p:extLst>
+  </p:cSld>
+  <p:clrMapOvr>
+    <a:masterClrMapping/>
+  </p:clrMapOvr>
+</p:notes>
+</file>
+
+<file path=ppt/notesSlides/notesSlide7.xml><?xml version="1.0" encoding="utf-8"?>
+<p:notes xmlns:a="http://schemas.openxmlformats.org/drawingml/2006/main" xmlns:r="http://schemas.openxmlformats.org/officeDocument/2006/relationships" xmlns:p="http://schemas.openxmlformats.org/presentationml/2006/main">
+  <p:cSld>
+    <p:spTree>
+      <p:nvGrpSpPr>
+        <p:cNvPr id="1" name=""/>
+        <p:cNvGrpSpPr/>
+        <p:nvPr/>
+      </p:nvGrpSpPr>
+      <p:grpSpPr>
+        <a:xfrm>
+          <a:off x="0" y="0"/>
+          <a:ext cx="0" cy="0"/>
+          <a:chOff x="0" y="0"/>
+          <a:chExt cx="0" cy="0"/>
+        </a:xfrm>
+      </p:grpSpPr>
+      <p:sp>
+        <p:nvSpPr>
+          <p:cNvPr id="2" name="Folienbildplatzhalter 1"/>
+          <p:cNvSpPr>
+            <a:spLocks noGrp="1" noRot="1" noChangeAspect="1"/>
+          </p:cNvSpPr>
+          <p:nvPr>
+            <p:ph type="sldImg"/>
+          </p:nvPr>
+        </p:nvSpPr>
+        <p:spPr>
+          <a:xfrm>
+            <a:off x="2740025" y="500063"/>
+            <a:ext cx="4445000" cy="2500312"/>
+          </a:xfrm>
+        </p:spPr>
+      </p:sp>
+      <p:sp>
+        <p:nvSpPr>
+          <p:cNvPr id="3" name="Notizenplatzhalter 2"/>
+          <p:cNvSpPr>
+            <a:spLocks noGrp="1"/>
+          </p:cNvSpPr>
+          <p:nvPr>
+            <p:ph type="body" idx="1"/>
+          </p:nvPr>
+        </p:nvSpPr>
+        <p:spPr/>
+        <p:txBody>
+          <a:bodyPr/>
+          <a:lstStyle/>
+          <a:p>
+            <a:endParaRPr lang="de-DE" dirty="0"/>
+          </a:p>
+        </p:txBody>
+      </p:sp>
+      <p:sp>
+        <p:nvSpPr>
+          <p:cNvPr id="4" name="Foliennummernplatzhalter 3"/>
+          <p:cNvSpPr>
+            <a:spLocks noGrp="1"/>
+          </p:cNvSpPr>
+          <p:nvPr>
+            <p:ph type="sldNum" sz="quarter" idx="5"/>
+          </p:nvPr>
+        </p:nvSpPr>
+        <p:spPr/>
+        <p:txBody>
+          <a:bodyPr/>
+          <a:lstStyle/>
+          <a:p>
+            <a:pPr>
+              <a:defRPr/>
+            </a:pPr>
+            <a:fld id="{00AFC6D0-44D5-4EB7-828F-6F464F83D79A}" type="slidenum">
+              <a:rPr lang="en-GB" smtClean="0"/>
+              <a:pPr>
+                <a:defRPr/>
+              </a:pPr>
               <a:t>7</a:t>
             </a:fld>
             <a:endParaRPr lang="en-GB"/>
@@ -1433,7 +1527,7 @@
 </p:notes>
 </file>
 
-<file path=ppt/notesSlides/notesSlide7.xml><?xml version="1.0" encoding="utf-8"?>
+<file path=ppt/notesSlides/notesSlide8.xml><?xml version="1.0" encoding="utf-8"?>
 <p:notes xmlns:a="http://schemas.openxmlformats.org/drawingml/2006/main" xmlns:r="http://schemas.openxmlformats.org/officeDocument/2006/relationships" xmlns:p="http://schemas.openxmlformats.org/presentationml/2006/main">
   <p:cSld>
     <p:spTree>
@@ -9420,7 +9514,7 @@
           <p:nvPr>
             <p:extLst>
               <p:ext uri="{D42A27DB-BD31-4B8C-83A1-F6EECF244321}">
-                <p14:modId xmlns:p14="http://schemas.microsoft.com/office/powerpoint/2010/main" val="1709246299"/>
+                <p14:modId xmlns:p14="http://schemas.microsoft.com/office/powerpoint/2010/main" val="2473033461"/>
               </p:ext>
             </p:extLst>
           </p:nvPr>
@@ -9598,7 +9692,7 @@
                       <a:pPr algn="ctr"/>
                       <a:r>
                         <a:rPr lang="de-DE" dirty="0" err="1"/>
-                        <a:t>checkWinners</a:t>
+                        <a:t>evaluateRound</a:t>
                       </a:r>
                       <a:endParaRPr lang="de-DE" dirty="0"/>
                     </a:p>
@@ -9649,7 +9743,7 @@
                       <a:pPr algn="ctr"/>
                       <a:r>
                         <a:rPr lang="de-DE" dirty="0" err="1"/>
-                        <a:t>checkBalance</a:t>
+                        <a:t>roundCompleted</a:t>
                       </a:r>
                       <a:endParaRPr lang="de-DE" dirty="0"/>
                     </a:p>
@@ -9700,9 +9794,10 @@
                     <a:p>
                       <a:pPr algn="ctr"/>
                       <a:r>
-                        <a:rPr lang="de-DE" dirty="0"/>
-                        <a:t>check</a:t>
+                        <a:rPr lang="de-DE" dirty="0" err="1"/>
+                        <a:t>initializeDeck</a:t>
                       </a:r>
+                      <a:endParaRPr lang="de-DE" dirty="0"/>
                     </a:p>
                   </a:txBody>
                   <a:tcPr/>
@@ -9842,7 +9937,11 @@
                     <a:lstStyle/>
                     <a:p>
                       <a:pPr algn="ctr"/>
-                      <a:endParaRPr lang="de-DE"/>
+                      <a:r>
+                        <a:rPr lang="de-DE" dirty="0" err="1"/>
+                        <a:t>nextTurn</a:t>
+                      </a:r>
+                      <a:endParaRPr lang="de-DE" dirty="0"/>
                     </a:p>
                   </a:txBody>
                   <a:tcPr/>
@@ -9964,135 +10063,6 @@
 </file>
 
 <file path=ppt/slides/slide13.xml><?xml version="1.0" encoding="utf-8"?>
-<p:sld xmlns:a="http://schemas.openxmlformats.org/drawingml/2006/main" xmlns:r="http://schemas.openxmlformats.org/officeDocument/2006/relationships" xmlns:p="http://schemas.openxmlformats.org/presentationml/2006/main">
-  <p:cSld>
-    <p:spTree>
-      <p:nvGrpSpPr>
-        <p:cNvPr id="1" name=""/>
-        <p:cNvGrpSpPr/>
-        <p:nvPr/>
-      </p:nvGrpSpPr>
-      <p:grpSpPr>
-        <a:xfrm>
-          <a:off x="0" y="0"/>
-          <a:ext cx="0" cy="0"/>
-          <a:chOff x="0" y="0"/>
-          <a:chExt cx="0" cy="0"/>
-        </a:xfrm>
-      </p:grpSpPr>
-      <p:sp>
-        <p:nvSpPr>
-          <p:cNvPr id="4" name="Foliennummernplatzhalter 3"/>
-          <p:cNvSpPr>
-            <a:spLocks noGrp="1"/>
-          </p:cNvSpPr>
-          <p:nvPr>
-            <p:ph type="sldNum" sz="quarter" idx="11"/>
-          </p:nvPr>
-        </p:nvSpPr>
-        <p:spPr/>
-        <p:txBody>
-          <a:bodyPr/>
-          <a:lstStyle/>
-          <a:p>
-            <a:fld id="{CE58CB1E-F828-4F11-99E0-327109AF9DA4}" type="slidenum">
-              <a:rPr lang="de-DE" smtClean="0"/>
-              <a:pPr/>
-              <a:t>13</a:t>
-            </a:fld>
-            <a:endParaRPr lang="de-DE" dirty="0"/>
-          </a:p>
-        </p:txBody>
-      </p:sp>
-      <p:sp>
-        <p:nvSpPr>
-          <p:cNvPr id="6" name="Fußzeilenplatzhalter 4"/>
-          <p:cNvSpPr>
-            <a:spLocks noGrp="1"/>
-          </p:cNvSpPr>
-          <p:nvPr>
-            <p:ph type="ftr" sz="quarter" idx="12"/>
-          </p:nvPr>
-        </p:nvSpPr>
-        <p:spPr/>
-        <p:txBody>
-          <a:bodyPr/>
-          <a:lstStyle/>
-          <a:p>
-            <a:r>
-              <a:rPr lang="en-US" dirty="0" err="1"/>
-              <a:t>Xlink</a:t>
-            </a:r>
-            <a:r>
-              <a:rPr lang="en-US" dirty="0"/>
-              <a:t> | </a:t>
-            </a:r>
-            <a:r>
-              <a:rPr lang="en-US" dirty="0" err="1"/>
-              <a:t>DocBook</a:t>
-            </a:r>
-            <a:r>
-              <a:rPr lang="en-US" dirty="0"/>
-              <a:t> </a:t>
-            </a:r>
-            <a:r>
-              <a:rPr lang="en-US" dirty="0" err="1"/>
-              <a:t>Dokumentation</a:t>
-            </a:r>
-            <a:endParaRPr lang="en-US" dirty="0"/>
-          </a:p>
-        </p:txBody>
-      </p:sp>
-      <p:sp>
-        <p:nvSpPr>
-          <p:cNvPr id="3" name="Titel 2"/>
-          <p:cNvSpPr>
-            <a:spLocks noGrp="1"/>
-          </p:cNvSpPr>
-          <p:nvPr>
-            <p:ph type="title"/>
-          </p:nvPr>
-        </p:nvSpPr>
-        <p:spPr>
-          <a:xfrm>
-            <a:off x="319091" y="745751"/>
-            <a:ext cx="8508999" cy="307777"/>
-          </a:xfrm>
-          <a:prstGeom prst="rect">
-            <a:avLst/>
-          </a:prstGeom>
-        </p:spPr>
-        <p:txBody>
-          <a:bodyPr/>
-          <a:lstStyle/>
-          <a:p>
-            <a:pPr algn="ctr"/>
-            <a:r>
-              <a:rPr lang="de-DE" dirty="0"/>
-              <a:t>Ausblick MVC im </a:t>
-            </a:r>
-            <a:r>
-              <a:rPr lang="de-DE" dirty="0" err="1"/>
-              <a:t>DocBook</a:t>
-            </a:r>
-            <a:endParaRPr lang="de-DE" dirty="0"/>
-          </a:p>
-        </p:txBody>
-      </p:sp>
-    </p:spTree>
-    <p:extLst>
-      <p:ext uri="{BB962C8B-B14F-4D97-AF65-F5344CB8AC3E}">
-        <p14:creationId xmlns:p14="http://schemas.microsoft.com/office/powerpoint/2010/main" val="2914764933"/>
-      </p:ext>
-    </p:extLst>
-  </p:cSld>
-  <p:clrMapOvr>
-    <a:masterClrMapping/>
-  </p:clrMapOvr>
-</p:sld>
-</file>
-
-<file path=ppt/slides/slide14.xml><?xml version="1.0" encoding="utf-8"?>
 <p:sld xmlns:a="http://schemas.openxmlformats.org/drawingml/2006/main" xmlns:r="http://schemas.openxmlformats.org/officeDocument/2006/relationships" xmlns:p="http://schemas.openxmlformats.org/presentationml/2006/main">
   <p:cSld>
     <p:spTree>
@@ -11340,8 +11310,8 @@
         </p:nvSpPr>
         <p:spPr>
           <a:xfrm>
-            <a:off x="319091" y="745751"/>
-            <a:ext cx="8508999" cy="307777"/>
+            <a:off x="317935" y="2417861"/>
+            <a:ext cx="8508999" cy="332976"/>
           </a:xfrm>
           <a:prstGeom prst="rect">
             <a:avLst/>
@@ -11352,123 +11322,42 @@
           <a:lstStyle/>
           <a:p>
             <a:pPr algn="ctr"/>
-            <a:endParaRPr lang="de-DE" dirty="0"/>
-          </a:p>
-        </p:txBody>
-      </p:sp>
-      <p:sp>
-        <p:nvSpPr>
-          <p:cNvPr id="2" name="Textfeld 1">
-            <a:extLst>
-              <a:ext uri="{FF2B5EF4-FFF2-40B4-BE49-F238E27FC236}">
-                <a16:creationId xmlns:a16="http://schemas.microsoft.com/office/drawing/2014/main" id="{B78A35C3-FC4F-C946-A075-804AE4869859}"/>
-              </a:ext>
-            </a:extLst>
-          </p:cNvPr>
-          <p:cNvSpPr txBox="1"/>
-          <p:nvPr/>
-        </p:nvSpPr>
-        <p:spPr>
-          <a:xfrm>
-            <a:off x="755374" y="1804946"/>
-            <a:ext cx="7506031" cy="818686"/>
-          </a:xfrm>
-          <a:prstGeom prst="rect">
-            <a:avLst/>
-          </a:prstGeom>
-          <a:noFill/>
-        </p:spPr>
-        <p:txBody>
-          <a:bodyPr wrap="square" lIns="0" tIns="0" rIns="0" bIns="0" rtlCol="0">
-            <a:spAutoFit/>
-          </a:bodyPr>
-          <a:lstStyle/>
-          <a:p>
-            <a:pPr>
-              <a:lnSpc>
-                <a:spcPct val="114000"/>
-              </a:lnSpc>
-            </a:pPr>
-            <a:r>
-              <a:rPr lang="de-DE" sz="1600" dirty="0">
-                <a:latin typeface="+mn-lt"/>
-              </a:rPr>
-              <a:t>Wir haben das </a:t>
-            </a:r>
-            <a:r>
-              <a:rPr lang="de-DE" sz="1600" dirty="0" err="1">
-                <a:latin typeface="+mn-lt"/>
-              </a:rPr>
-              <a:t>DocBook</a:t>
-            </a:r>
-            <a:r>
-              <a:rPr lang="de-DE" sz="1600" dirty="0">
-                <a:latin typeface="+mn-lt"/>
-              </a:rPr>
-              <a:t> so aufgebaut dass wir die Technologie die wir benutzt haben (XML, XSLT, </a:t>
-            </a:r>
-            <a:r>
-              <a:rPr lang="de-DE" sz="1600" dirty="0" err="1">
-                <a:latin typeface="+mn-lt"/>
-              </a:rPr>
-              <a:t>xQuery</a:t>
-            </a:r>
-            <a:r>
-              <a:rPr lang="de-DE" sz="1600" dirty="0">
-                <a:latin typeface="+mn-lt"/>
-              </a:rPr>
-              <a:t>, </a:t>
-            </a:r>
-            <a:r>
-              <a:rPr lang="de-DE" sz="1600" dirty="0" err="1">
-                <a:latin typeface="+mn-lt"/>
-              </a:rPr>
-              <a:t>xPath</a:t>
-            </a:r>
-            <a:r>
-              <a:rPr lang="de-DE" sz="1600" dirty="0">
-                <a:latin typeface="+mn-lt"/>
-              </a:rPr>
-              <a:t>) erstmal vorgestellt haben</a:t>
-            </a:r>
-          </a:p>
-          <a:p>
-            <a:pPr>
-              <a:lnSpc>
-                <a:spcPct val="114000"/>
-              </a:lnSpc>
-            </a:pPr>
-            <a:r>
-              <a:rPr lang="de-DE" sz="1600" dirty="0">
-                <a:latin typeface="+mn-lt"/>
-                <a:sym typeface="Wingdings" pitchFamily="2" charset="2"/>
-              </a:rPr>
-              <a:t> Dazu findet man </a:t>
-            </a:r>
-            <a:r>
-              <a:rPr lang="de-DE" sz="1600" dirty="0" err="1">
-                <a:latin typeface="+mn-lt"/>
-                <a:sym typeface="Wingdings" pitchFamily="2" charset="2"/>
-              </a:rPr>
-              <a:t>screenshots</a:t>
-            </a:r>
-            <a:r>
-              <a:rPr lang="de-DE" sz="1600" dirty="0">
-                <a:latin typeface="+mn-lt"/>
-                <a:sym typeface="Wingdings" pitchFamily="2" charset="2"/>
-              </a:rPr>
-              <a:t> auf den folgenden Seiten</a:t>
-            </a:r>
-            <a:endParaRPr lang="de-DE" sz="1600" dirty="0">
-              <a:latin typeface="+mn-lt"/>
-            </a:endParaRPr>
+            <a:r>
+              <a:rPr lang="de-DE" sz="3500" dirty="0" err="1"/>
+              <a:t>Documentation</a:t>
+            </a:r>
+            <a:r>
+              <a:rPr lang="de-DE" sz="3500" dirty="0"/>
+              <a:t> </a:t>
+            </a:r>
+            <a:r>
+              <a:rPr lang="de-DE" sz="3500" dirty="0" err="1"/>
+              <a:t>of</a:t>
+            </a:r>
+            <a:r>
+              <a:rPr lang="de-DE" sz="3500" dirty="0"/>
+              <a:t> </a:t>
+            </a:r>
+            <a:r>
+              <a:rPr lang="de-DE" sz="3500" dirty="0" err="1"/>
+              <a:t>used</a:t>
+            </a:r>
+            <a:r>
+              <a:rPr lang="de-DE" sz="3500" dirty="0"/>
+              <a:t> </a:t>
+            </a:r>
+            <a:r>
+              <a:rPr lang="de-DE" sz="3500" dirty="0" err="1"/>
+              <a:t>technologies</a:t>
+            </a:r>
+            <a:endParaRPr lang="de-DE" sz="3500" dirty="0"/>
           </a:p>
         </p:txBody>
       </p:sp>
     </p:spTree>
     <p:extLst>
       <p:ext uri="{BB962C8B-B14F-4D97-AF65-F5344CB8AC3E}">
-        <p14:creationId xmlns:p14="http://schemas.microsoft.com/office/powerpoint/2010/main" val="177649110"/>
+        <p14:creationId xmlns:p14="http://schemas.microsoft.com/office/powerpoint/2010/main" val="3738177429"/>
       </p:ext>
     </p:extLst>
   </p:cSld>

</xml_diff>

<commit_message>
Kleine Veränderung bei den Zwischenüberschriften
</commit_message>
<xml_diff>
--- a/Präsentationen/PP_notenbonus.pptx
+++ b/Präsentationen/PP_notenbonus.pptx
@@ -10720,26 +10720,17 @@
           <a:p>
             <a:pPr algn="ctr"/>
             <a:r>
-              <a:rPr lang="de-DE" sz="3500" dirty="0" err="1"/>
-              <a:t>Documentation</a:t>
-            </a:r>
-            <a:r>
               <a:rPr lang="de-DE" sz="3500" dirty="0"/>
-              <a:t> </a:t>
-            </a:r>
-            <a:r>
-              <a:rPr lang="de-DE" sz="3500" dirty="0" err="1"/>
-              <a:t>of</a:t>
-            </a:r>
-            <a:r>
-              <a:rPr lang="de-DE" sz="3500" dirty="0"/>
-              <a:t> design </a:t>
+              <a:t>Dokumentation ‚design </a:t>
             </a:r>
             <a:r>
               <a:rPr lang="de-DE" sz="3500" dirty="0" err="1"/>
               <a:t>choices</a:t>
             </a:r>
-            <a:endParaRPr lang="de-DE" sz="3500" dirty="0"/>
+            <a:r>
+              <a:rPr lang="de-DE" sz="3500" dirty="0"/>
+              <a:t>‘</a:t>
+            </a:r>
           </a:p>
         </p:txBody>
       </p:sp>
@@ -11323,8 +11314,12 @@
           <a:p>
             <a:pPr algn="ctr"/>
             <a:r>
+              <a:rPr lang="de-DE" sz="3500" dirty="0"/>
+              <a:t>Dokumentation ‚</a:t>
+            </a:r>
+            <a:r>
               <a:rPr lang="de-DE" sz="3500" dirty="0" err="1"/>
-              <a:t>Documentation</a:t>
+              <a:t>used</a:t>
             </a:r>
             <a:r>
               <a:rPr lang="de-DE" sz="3500" dirty="0"/>
@@ -11332,25 +11327,12 @@
             </a:r>
             <a:r>
               <a:rPr lang="de-DE" sz="3500" dirty="0" err="1"/>
-              <a:t>of</a:t>
+              <a:t>technologies</a:t>
             </a:r>
             <a:r>
               <a:rPr lang="de-DE" sz="3500" dirty="0"/>
-              <a:t> </a:t>
-            </a:r>
-            <a:r>
-              <a:rPr lang="de-DE" sz="3500" dirty="0" err="1"/>
-              <a:t>used</a:t>
-            </a:r>
-            <a:r>
-              <a:rPr lang="de-DE" sz="3500" dirty="0"/>
-              <a:t> </a:t>
-            </a:r>
-            <a:r>
-              <a:rPr lang="de-DE" sz="3500" dirty="0" err="1"/>
-              <a:t>technologies</a:t>
-            </a:r>
-            <a:endParaRPr lang="de-DE" sz="3500" dirty="0"/>
+              <a:t>‘</a:t>
+            </a:r>
           </a:p>
         </p:txBody>
       </p:sp>

</xml_diff>

<commit_message>
Noch eine Folie hinzugefügt zu XSLT Processor
</commit_message>
<xml_diff>
--- a/Präsentationen/PP_notenbonus.pptx
+++ b/Präsentationen/PP_notenbonus.pptx
@@ -10,10 +10,10 @@
     <p:sldMasterId id="2147483697" r:id="rId6"/>
   </p:sldMasterIdLst>
   <p:notesMasterIdLst>
-    <p:notesMasterId r:id="rId20"/>
+    <p:notesMasterId r:id="rId21"/>
   </p:notesMasterIdLst>
   <p:handoutMasterIdLst>
-    <p:handoutMasterId r:id="rId21"/>
+    <p:handoutMasterId r:id="rId22"/>
   </p:handoutMasterIdLst>
   <p:sldIdLst>
     <p:sldId id="356" r:id="rId7"/>
@@ -21,19 +21,20 @@
     <p:sldId id="379" r:id="rId9"/>
     <p:sldId id="380" r:id="rId10"/>
     <p:sldId id="381" r:id="rId11"/>
-    <p:sldId id="382" r:id="rId12"/>
-    <p:sldId id="376" r:id="rId13"/>
-    <p:sldId id="375" r:id="rId14"/>
-    <p:sldId id="374" r:id="rId15"/>
-    <p:sldId id="370" r:id="rId16"/>
-    <p:sldId id="372" r:id="rId17"/>
-    <p:sldId id="373" r:id="rId18"/>
-    <p:sldId id="279" r:id="rId19"/>
+    <p:sldId id="383" r:id="rId12"/>
+    <p:sldId id="382" r:id="rId13"/>
+    <p:sldId id="376" r:id="rId14"/>
+    <p:sldId id="375" r:id="rId15"/>
+    <p:sldId id="374" r:id="rId16"/>
+    <p:sldId id="370" r:id="rId17"/>
+    <p:sldId id="372" r:id="rId18"/>
+    <p:sldId id="373" r:id="rId19"/>
+    <p:sldId id="279" r:id="rId20"/>
   </p:sldIdLst>
   <p:sldSz cx="9144000" cy="5143500" type="screen16x9"/>
   <p:notesSz cx="9925050" cy="6665913"/>
   <p:custDataLst>
-    <p:tags r:id="rId22"/>
+    <p:tags r:id="rId23"/>
   </p:custDataLst>
   <p:defaultTextStyle>
     <a:defPPr>
@@ -1422,7 +1423,7 @@
     </p:spTree>
     <p:extLst>
       <p:ext uri="{BB962C8B-B14F-4D97-AF65-F5344CB8AC3E}">
-        <p14:creationId xmlns:p14="http://schemas.microsoft.com/office/powerpoint/2010/main" val="1408043966"/>
+        <p14:creationId xmlns:p14="http://schemas.microsoft.com/office/powerpoint/2010/main" val="1883340736"/>
       </p:ext>
     </p:extLst>
   </p:cSld>
@@ -1517,7 +1518,7 @@
     </p:spTree>
     <p:extLst>
       <p:ext uri="{BB962C8B-B14F-4D97-AF65-F5344CB8AC3E}">
-        <p14:creationId xmlns:p14="http://schemas.microsoft.com/office/powerpoint/2010/main" val="252278236"/>
+        <p14:creationId xmlns:p14="http://schemas.microsoft.com/office/powerpoint/2010/main" val="1408043966"/>
       </p:ext>
     </p:extLst>
   </p:cSld>
@@ -1603,7 +1604,102 @@
               <a:pPr>
                 <a:defRPr/>
               </a:pPr>
-              <a:t>10</a:t>
+              <a:t>8</a:t>
+            </a:fld>
+            <a:endParaRPr lang="en-GB"/>
+          </a:p>
+        </p:txBody>
+      </p:sp>
+    </p:spTree>
+    <p:extLst>
+      <p:ext uri="{BB962C8B-B14F-4D97-AF65-F5344CB8AC3E}">
+        <p14:creationId xmlns:p14="http://schemas.microsoft.com/office/powerpoint/2010/main" val="252278236"/>
+      </p:ext>
+    </p:extLst>
+  </p:cSld>
+  <p:clrMapOvr>
+    <a:masterClrMapping/>
+  </p:clrMapOvr>
+</p:notes>
+</file>
+
+<file path=ppt/notesSlides/notesSlide9.xml><?xml version="1.0" encoding="utf-8"?>
+<p:notes xmlns:a="http://schemas.openxmlformats.org/drawingml/2006/main" xmlns:r="http://schemas.openxmlformats.org/officeDocument/2006/relationships" xmlns:p="http://schemas.openxmlformats.org/presentationml/2006/main">
+  <p:cSld>
+    <p:spTree>
+      <p:nvGrpSpPr>
+        <p:cNvPr id="1" name=""/>
+        <p:cNvGrpSpPr/>
+        <p:nvPr/>
+      </p:nvGrpSpPr>
+      <p:grpSpPr>
+        <a:xfrm>
+          <a:off x="0" y="0"/>
+          <a:ext cx="0" cy="0"/>
+          <a:chOff x="0" y="0"/>
+          <a:chExt cx="0" cy="0"/>
+        </a:xfrm>
+      </p:grpSpPr>
+      <p:sp>
+        <p:nvSpPr>
+          <p:cNvPr id="2" name="Folienbildplatzhalter 1"/>
+          <p:cNvSpPr>
+            <a:spLocks noGrp="1" noRot="1" noChangeAspect="1"/>
+          </p:cNvSpPr>
+          <p:nvPr>
+            <p:ph type="sldImg"/>
+          </p:nvPr>
+        </p:nvSpPr>
+        <p:spPr>
+          <a:xfrm>
+            <a:off x="2740025" y="500063"/>
+            <a:ext cx="4445000" cy="2500312"/>
+          </a:xfrm>
+        </p:spPr>
+      </p:sp>
+      <p:sp>
+        <p:nvSpPr>
+          <p:cNvPr id="3" name="Notizenplatzhalter 2"/>
+          <p:cNvSpPr>
+            <a:spLocks noGrp="1"/>
+          </p:cNvSpPr>
+          <p:nvPr>
+            <p:ph type="body" idx="1"/>
+          </p:nvPr>
+        </p:nvSpPr>
+        <p:spPr/>
+        <p:txBody>
+          <a:bodyPr/>
+          <a:lstStyle/>
+          <a:p>
+            <a:endParaRPr lang="de-DE" dirty="0"/>
+          </a:p>
+        </p:txBody>
+      </p:sp>
+      <p:sp>
+        <p:nvSpPr>
+          <p:cNvPr id="4" name="Foliennummernplatzhalter 3"/>
+          <p:cNvSpPr>
+            <a:spLocks noGrp="1"/>
+          </p:cNvSpPr>
+          <p:nvPr>
+            <p:ph type="sldNum" sz="quarter" idx="5"/>
+          </p:nvPr>
+        </p:nvSpPr>
+        <p:spPr/>
+        <p:txBody>
+          <a:bodyPr/>
+          <a:lstStyle/>
+          <a:p>
+            <a:pPr>
+              <a:defRPr/>
+            </a:pPr>
+            <a:fld id="{00AFC6D0-44D5-4EB7-828F-6F464F83D79A}" type="slidenum">
+              <a:rPr lang="en-GB" smtClean="0"/>
+              <a:pPr>
+                <a:defRPr/>
+              </a:pPr>
+              <a:t>11</a:t>
             </a:fld>
             <a:endParaRPr lang="en-GB"/>
           </a:p>
@@ -8737,6 +8833,161 @@
           </p:nvPr>
         </p:nvSpPr>
         <p:spPr>
+          <a:xfrm>
+            <a:off x="319091" y="745751"/>
+            <a:ext cx="8508999" cy="307777"/>
+          </a:xfrm>
+          <a:prstGeom prst="rect">
+            <a:avLst/>
+          </a:prstGeom>
+        </p:spPr>
+        <p:txBody>
+          <a:bodyPr/>
+          <a:lstStyle/>
+          <a:p>
+            <a:pPr algn="ctr"/>
+            <a:r>
+              <a:rPr lang="de-DE" dirty="0" err="1"/>
+              <a:t>DocBook</a:t>
+            </a:r>
+            <a:endParaRPr lang="de-DE" dirty="0"/>
+          </a:p>
+        </p:txBody>
+      </p:sp>
+      <p:pic>
+        <p:nvPicPr>
+          <p:cNvPr id="5" name="Grafik 4">
+            <a:extLst>
+              <a:ext uri="{FF2B5EF4-FFF2-40B4-BE49-F238E27FC236}">
+                <a16:creationId xmlns:a16="http://schemas.microsoft.com/office/drawing/2014/main" id="{F34106F0-6CC1-7E45-A429-47EA60503F92}"/>
+              </a:ext>
+            </a:extLst>
+          </p:cNvPr>
+          <p:cNvPicPr>
+            <a:picLocks noChangeAspect="1"/>
+          </p:cNvPicPr>
+          <p:nvPr/>
+        </p:nvPicPr>
+        <p:blipFill>
+          <a:blip r:embed="rId2"/>
+          <a:stretch>
+            <a:fillRect/>
+          </a:stretch>
+        </p:blipFill>
+        <p:spPr>
+          <a:xfrm>
+            <a:off x="657230" y="1870980"/>
+            <a:ext cx="7829539" cy="1401539"/>
+          </a:xfrm>
+          <a:prstGeom prst="rect">
+            <a:avLst/>
+          </a:prstGeom>
+        </p:spPr>
+      </p:pic>
+    </p:spTree>
+    <p:extLst>
+      <p:ext uri="{BB962C8B-B14F-4D97-AF65-F5344CB8AC3E}">
+        <p14:creationId xmlns:p14="http://schemas.microsoft.com/office/powerpoint/2010/main" val="3674180149"/>
+      </p:ext>
+    </p:extLst>
+  </p:cSld>
+  <p:clrMapOvr>
+    <a:masterClrMapping/>
+  </p:clrMapOvr>
+</p:sld>
+</file>
+
+<file path=ppt/slides/slide11.xml><?xml version="1.0" encoding="utf-8"?>
+<p:sld xmlns:a="http://schemas.openxmlformats.org/drawingml/2006/main" xmlns:r="http://schemas.openxmlformats.org/officeDocument/2006/relationships" xmlns:p="http://schemas.openxmlformats.org/presentationml/2006/main">
+  <p:cSld>
+    <p:spTree>
+      <p:nvGrpSpPr>
+        <p:cNvPr id="1" name=""/>
+        <p:cNvGrpSpPr/>
+        <p:nvPr/>
+      </p:nvGrpSpPr>
+      <p:grpSpPr>
+        <a:xfrm>
+          <a:off x="0" y="0"/>
+          <a:ext cx="0" cy="0"/>
+          <a:chOff x="0" y="0"/>
+          <a:chExt cx="0" cy="0"/>
+        </a:xfrm>
+      </p:grpSpPr>
+      <p:sp>
+        <p:nvSpPr>
+          <p:cNvPr id="4" name="Foliennummernplatzhalter 3"/>
+          <p:cNvSpPr>
+            <a:spLocks noGrp="1"/>
+          </p:cNvSpPr>
+          <p:nvPr>
+            <p:ph type="sldNum" sz="quarter" idx="11"/>
+          </p:nvPr>
+        </p:nvSpPr>
+        <p:spPr/>
+        <p:txBody>
+          <a:bodyPr/>
+          <a:lstStyle/>
+          <a:p>
+            <a:fld id="{CE58CB1E-F828-4F11-99E0-327109AF9DA4}" type="slidenum">
+              <a:rPr lang="de-DE" smtClean="0"/>
+              <a:pPr/>
+              <a:t>11</a:t>
+            </a:fld>
+            <a:endParaRPr lang="de-DE" dirty="0"/>
+          </a:p>
+        </p:txBody>
+      </p:sp>
+      <p:sp>
+        <p:nvSpPr>
+          <p:cNvPr id="6" name="Fußzeilenplatzhalter 4"/>
+          <p:cNvSpPr>
+            <a:spLocks noGrp="1"/>
+          </p:cNvSpPr>
+          <p:nvPr>
+            <p:ph type="ftr" sz="quarter" idx="12"/>
+          </p:nvPr>
+        </p:nvSpPr>
+        <p:spPr/>
+        <p:txBody>
+          <a:bodyPr/>
+          <a:lstStyle/>
+          <a:p>
+            <a:r>
+              <a:rPr lang="en-US" dirty="0" err="1"/>
+              <a:t>Xlink</a:t>
+            </a:r>
+            <a:r>
+              <a:rPr lang="en-US" dirty="0"/>
+              <a:t> | </a:t>
+            </a:r>
+            <a:r>
+              <a:rPr lang="en-US" dirty="0" err="1"/>
+              <a:t>DocBook</a:t>
+            </a:r>
+            <a:r>
+              <a:rPr lang="en-US" dirty="0"/>
+              <a:t> </a:t>
+            </a:r>
+            <a:r>
+              <a:rPr lang="en-US" dirty="0" err="1"/>
+              <a:t>Dokumentation</a:t>
+            </a:r>
+            <a:endParaRPr lang="en-US" dirty="0"/>
+          </a:p>
+        </p:txBody>
+      </p:sp>
+      <p:sp>
+        <p:nvSpPr>
+          <p:cNvPr id="3" name="Titel 2"/>
+          <p:cNvSpPr>
+            <a:spLocks noGrp="1"/>
+          </p:cNvSpPr>
+          <p:nvPr>
+            <p:ph type="title"/>
+          </p:nvPr>
+        </p:nvSpPr>
+        <p:spPr>
           <a:prstGeom prst="rect">
             <a:avLst/>
           </a:prstGeom>
@@ -8796,7 +9047,7 @@
 </p:sld>
 </file>
 
-<file path=ppt/slides/slide11.xml><?xml version="1.0" encoding="utf-8"?>
+<file path=ppt/slides/slide12.xml><?xml version="1.0" encoding="utf-8"?>
 <p:sld xmlns:a="http://schemas.openxmlformats.org/drawingml/2006/main" xmlns:r="http://schemas.openxmlformats.org/officeDocument/2006/relationships" xmlns:p="http://schemas.openxmlformats.org/presentationml/2006/main">
   <p:cSld>
     <p:spTree>
@@ -8831,7 +9082,7 @@
             <a:fld id="{CE58CB1E-F828-4F11-99E0-327109AF9DA4}" type="slidenum">
               <a:rPr lang="de-DE" smtClean="0"/>
               <a:pPr/>
-              <a:t>11</a:t>
+              <a:t>12</a:t>
             </a:fld>
             <a:endParaRPr lang="de-DE" dirty="0"/>
           </a:p>
@@ -9371,7 +9622,7 @@
 </p:sld>
 </file>
 
-<file path=ppt/slides/slide12.xml><?xml version="1.0" encoding="utf-8"?>
+<file path=ppt/slides/slide13.xml><?xml version="1.0" encoding="utf-8"?>
 <p:sld xmlns:a="http://schemas.openxmlformats.org/drawingml/2006/main" xmlns:r="http://schemas.openxmlformats.org/officeDocument/2006/relationships" xmlns:p="http://schemas.openxmlformats.org/presentationml/2006/main">
   <p:cSld>
     <p:spTree>
@@ -9406,7 +9657,7 @@
             <a:fld id="{CE58CB1E-F828-4F11-99E0-327109AF9DA4}" type="slidenum">
               <a:rPr lang="de-DE" smtClean="0"/>
               <a:pPr/>
-              <a:t>12</a:t>
+              <a:t>13</a:t>
             </a:fld>
             <a:endParaRPr lang="de-DE" dirty="0"/>
           </a:p>
@@ -10062,7 +10313,7 @@
 </p:sld>
 </file>
 
-<file path=ppt/slides/slide13.xml><?xml version="1.0" encoding="utf-8"?>
+<file path=ppt/slides/slide14.xml><?xml version="1.0" encoding="utf-8"?>
 <p:sld xmlns:a="http://schemas.openxmlformats.org/drawingml/2006/main" xmlns:r="http://schemas.openxmlformats.org/officeDocument/2006/relationships" xmlns:p="http://schemas.openxmlformats.org/presentationml/2006/main">
   <p:cSld>
     <p:spTree>
@@ -11301,8 +11552,8 @@
         </p:nvSpPr>
         <p:spPr>
           <a:xfrm>
-            <a:off x="317935" y="2417861"/>
-            <a:ext cx="8508999" cy="332976"/>
+            <a:off x="319091" y="745751"/>
+            <a:ext cx="8508999" cy="307777"/>
           </a:xfrm>
           <a:prstGeom prst="rect">
             <a:avLst/>
@@ -11314,32 +11565,51 @@
           <a:p>
             <a:pPr algn="ctr"/>
             <a:r>
-              <a:rPr lang="de-DE" sz="3500" dirty="0"/>
-              <a:t>Dokumentation ‚</a:t>
-            </a:r>
-            <a:r>
-              <a:rPr lang="de-DE" sz="3500" dirty="0" err="1"/>
-              <a:t>used</a:t>
-            </a:r>
-            <a:r>
-              <a:rPr lang="de-DE" sz="3500" dirty="0"/>
-              <a:t> </a:t>
-            </a:r>
-            <a:r>
-              <a:rPr lang="de-DE" sz="3500" dirty="0" err="1"/>
-              <a:t>technologies</a:t>
-            </a:r>
-            <a:r>
-              <a:rPr lang="de-DE" sz="3500" dirty="0"/>
-              <a:t>‘</a:t>
-            </a:r>
-          </a:p>
-        </p:txBody>
-      </p:sp>
+              <a:rPr lang="de-DE" dirty="0"/>
+              <a:t>XSLT </a:t>
+            </a:r>
+            <a:r>
+              <a:rPr lang="de-DE" dirty="0" err="1"/>
+              <a:t>Processor</a:t>
+            </a:r>
+            <a:endParaRPr lang="de-DE" dirty="0"/>
+          </a:p>
+        </p:txBody>
+      </p:sp>
+      <p:pic>
+        <p:nvPicPr>
+          <p:cNvPr id="7" name="Grafik 6" descr="Ein Bild, das Screenshot, sitzend, Monitor, schwarz enthält.&#10;&#10;Automatisch generierte Beschreibung">
+            <a:extLst>
+              <a:ext uri="{FF2B5EF4-FFF2-40B4-BE49-F238E27FC236}">
+                <a16:creationId xmlns:a16="http://schemas.microsoft.com/office/drawing/2014/main" id="{B5AB30A1-F8B1-4843-AE22-A1D883103B40}"/>
+              </a:ext>
+            </a:extLst>
+          </p:cNvPr>
+          <p:cNvPicPr>
+            <a:picLocks noChangeAspect="1"/>
+          </p:cNvPicPr>
+          <p:nvPr/>
+        </p:nvPicPr>
+        <p:blipFill>
+          <a:blip r:embed="rId3"/>
+          <a:stretch>
+            <a:fillRect/>
+          </a:stretch>
+        </p:blipFill>
+        <p:spPr>
+          <a:xfrm>
+            <a:off x="411480" y="1836048"/>
+            <a:ext cx="8321040" cy="1471404"/>
+          </a:xfrm>
+          <a:prstGeom prst="rect">
+            <a:avLst/>
+          </a:prstGeom>
+        </p:spPr>
+      </p:pic>
     </p:spTree>
     <p:extLst>
       <p:ext uri="{BB962C8B-B14F-4D97-AF65-F5344CB8AC3E}">
-        <p14:creationId xmlns:p14="http://schemas.microsoft.com/office/powerpoint/2010/main" val="3738177429"/>
+        <p14:creationId xmlns:p14="http://schemas.microsoft.com/office/powerpoint/2010/main" val="3603912618"/>
       </p:ext>
     </p:extLst>
   </p:cSld>
@@ -11385,6 +11655,146 @@
               <a:rPr lang="de-DE" smtClean="0"/>
               <a:pPr/>
               <a:t>7</a:t>
+            </a:fld>
+            <a:endParaRPr lang="de-DE" dirty="0"/>
+          </a:p>
+        </p:txBody>
+      </p:sp>
+      <p:sp>
+        <p:nvSpPr>
+          <p:cNvPr id="6" name="Fußzeilenplatzhalter 4"/>
+          <p:cNvSpPr>
+            <a:spLocks noGrp="1"/>
+          </p:cNvSpPr>
+          <p:nvPr>
+            <p:ph type="ftr" sz="quarter" idx="12"/>
+          </p:nvPr>
+        </p:nvSpPr>
+        <p:spPr/>
+        <p:txBody>
+          <a:bodyPr/>
+          <a:lstStyle/>
+          <a:p>
+            <a:r>
+              <a:rPr lang="en-US" dirty="0" err="1"/>
+              <a:t>Xlink</a:t>
+            </a:r>
+            <a:r>
+              <a:rPr lang="en-US" dirty="0"/>
+              <a:t> | </a:t>
+            </a:r>
+            <a:r>
+              <a:rPr lang="en-US" dirty="0" err="1"/>
+              <a:t>DocBook</a:t>
+            </a:r>
+            <a:r>
+              <a:rPr lang="en-US" dirty="0"/>
+              <a:t> </a:t>
+            </a:r>
+            <a:r>
+              <a:rPr lang="en-US" dirty="0" err="1"/>
+              <a:t>Dokumentation</a:t>
+            </a:r>
+            <a:endParaRPr lang="en-US" dirty="0"/>
+          </a:p>
+        </p:txBody>
+      </p:sp>
+      <p:sp>
+        <p:nvSpPr>
+          <p:cNvPr id="3" name="Titel 2"/>
+          <p:cNvSpPr>
+            <a:spLocks noGrp="1"/>
+          </p:cNvSpPr>
+          <p:nvPr>
+            <p:ph type="title"/>
+          </p:nvPr>
+        </p:nvSpPr>
+        <p:spPr>
+          <a:xfrm>
+            <a:off x="317935" y="2417861"/>
+            <a:ext cx="8508999" cy="332976"/>
+          </a:xfrm>
+          <a:prstGeom prst="rect">
+            <a:avLst/>
+          </a:prstGeom>
+        </p:spPr>
+        <p:txBody>
+          <a:bodyPr/>
+          <a:lstStyle/>
+          <a:p>
+            <a:pPr algn="ctr"/>
+            <a:r>
+              <a:rPr lang="de-DE" sz="3500" dirty="0"/>
+              <a:t>Dokumentation ‚</a:t>
+            </a:r>
+            <a:r>
+              <a:rPr lang="de-DE" sz="3500" dirty="0" err="1"/>
+              <a:t>used</a:t>
+            </a:r>
+            <a:r>
+              <a:rPr lang="de-DE" sz="3500" dirty="0"/>
+              <a:t> </a:t>
+            </a:r>
+            <a:r>
+              <a:rPr lang="de-DE" sz="3500" dirty="0" err="1"/>
+              <a:t>technologies</a:t>
+            </a:r>
+            <a:r>
+              <a:rPr lang="de-DE" sz="3500" dirty="0"/>
+              <a:t>‘</a:t>
+            </a:r>
+          </a:p>
+        </p:txBody>
+      </p:sp>
+    </p:spTree>
+    <p:extLst>
+      <p:ext uri="{BB962C8B-B14F-4D97-AF65-F5344CB8AC3E}">
+        <p14:creationId xmlns:p14="http://schemas.microsoft.com/office/powerpoint/2010/main" val="3738177429"/>
+      </p:ext>
+    </p:extLst>
+  </p:cSld>
+  <p:clrMapOvr>
+    <a:masterClrMapping/>
+  </p:clrMapOvr>
+</p:sld>
+</file>
+
+<file path=ppt/slides/slide8.xml><?xml version="1.0" encoding="utf-8"?>
+<p:sld xmlns:a="http://schemas.openxmlformats.org/drawingml/2006/main" xmlns:r="http://schemas.openxmlformats.org/officeDocument/2006/relationships" xmlns:p="http://schemas.openxmlformats.org/presentationml/2006/main">
+  <p:cSld>
+    <p:spTree>
+      <p:nvGrpSpPr>
+        <p:cNvPr id="1" name=""/>
+        <p:cNvGrpSpPr/>
+        <p:nvPr/>
+      </p:nvGrpSpPr>
+      <p:grpSpPr>
+        <a:xfrm>
+          <a:off x="0" y="0"/>
+          <a:ext cx="0" cy="0"/>
+          <a:chOff x="0" y="0"/>
+          <a:chExt cx="0" cy="0"/>
+        </a:xfrm>
+      </p:grpSpPr>
+      <p:sp>
+        <p:nvSpPr>
+          <p:cNvPr id="4" name="Foliennummernplatzhalter 3"/>
+          <p:cNvSpPr>
+            <a:spLocks noGrp="1"/>
+          </p:cNvSpPr>
+          <p:nvPr>
+            <p:ph type="sldNum" sz="quarter" idx="11"/>
+          </p:nvPr>
+        </p:nvSpPr>
+        <p:spPr/>
+        <p:txBody>
+          <a:bodyPr/>
+          <a:lstStyle/>
+          <a:p>
+            <a:fld id="{CE58CB1E-F828-4F11-99E0-327109AF9DA4}" type="slidenum">
+              <a:rPr lang="de-DE" smtClean="0"/>
+              <a:pPr/>
+              <a:t>8</a:t>
             </a:fld>
             <a:endParaRPr lang="de-DE" dirty="0"/>
           </a:p>
@@ -11503,7 +11913,7 @@
 </p:sld>
 </file>
 
-<file path=ppt/slides/slide8.xml><?xml version="1.0" encoding="utf-8"?>
+<file path=ppt/slides/slide9.xml><?xml version="1.0" encoding="utf-8"?>
 <p:sld xmlns:a="http://schemas.openxmlformats.org/drawingml/2006/main" xmlns:r="http://schemas.openxmlformats.org/officeDocument/2006/relationships" xmlns:p="http://schemas.openxmlformats.org/presentationml/2006/main">
   <p:cSld>
     <p:spTree>
@@ -11538,7 +11948,7 @@
             <a:fld id="{CE58CB1E-F828-4F11-99E0-327109AF9DA4}" type="slidenum">
               <a:rPr lang="de-DE" smtClean="0"/>
               <a:pPr/>
-              <a:t>8</a:t>
+              <a:t>9</a:t>
             </a:fld>
             <a:endParaRPr lang="de-DE" dirty="0"/>
           </a:p>
@@ -11648,161 +12058,6 @@
     <p:extLst>
       <p:ext uri="{BB962C8B-B14F-4D97-AF65-F5344CB8AC3E}">
         <p14:creationId xmlns:p14="http://schemas.microsoft.com/office/powerpoint/2010/main" val="2624432542"/>
-      </p:ext>
-    </p:extLst>
-  </p:cSld>
-  <p:clrMapOvr>
-    <a:masterClrMapping/>
-  </p:clrMapOvr>
-</p:sld>
-</file>
-
-<file path=ppt/slides/slide9.xml><?xml version="1.0" encoding="utf-8"?>
-<p:sld xmlns:a="http://schemas.openxmlformats.org/drawingml/2006/main" xmlns:r="http://schemas.openxmlformats.org/officeDocument/2006/relationships" xmlns:p="http://schemas.openxmlformats.org/presentationml/2006/main">
-  <p:cSld>
-    <p:spTree>
-      <p:nvGrpSpPr>
-        <p:cNvPr id="1" name=""/>
-        <p:cNvGrpSpPr/>
-        <p:nvPr/>
-      </p:nvGrpSpPr>
-      <p:grpSpPr>
-        <a:xfrm>
-          <a:off x="0" y="0"/>
-          <a:ext cx="0" cy="0"/>
-          <a:chOff x="0" y="0"/>
-          <a:chExt cx="0" cy="0"/>
-        </a:xfrm>
-      </p:grpSpPr>
-      <p:sp>
-        <p:nvSpPr>
-          <p:cNvPr id="4" name="Foliennummernplatzhalter 3"/>
-          <p:cNvSpPr>
-            <a:spLocks noGrp="1"/>
-          </p:cNvSpPr>
-          <p:nvPr>
-            <p:ph type="sldNum" sz="quarter" idx="11"/>
-          </p:nvPr>
-        </p:nvSpPr>
-        <p:spPr/>
-        <p:txBody>
-          <a:bodyPr/>
-          <a:lstStyle/>
-          <a:p>
-            <a:fld id="{CE58CB1E-F828-4F11-99E0-327109AF9DA4}" type="slidenum">
-              <a:rPr lang="de-DE" smtClean="0"/>
-              <a:pPr/>
-              <a:t>9</a:t>
-            </a:fld>
-            <a:endParaRPr lang="de-DE" dirty="0"/>
-          </a:p>
-        </p:txBody>
-      </p:sp>
-      <p:sp>
-        <p:nvSpPr>
-          <p:cNvPr id="6" name="Fußzeilenplatzhalter 4"/>
-          <p:cNvSpPr>
-            <a:spLocks noGrp="1"/>
-          </p:cNvSpPr>
-          <p:nvPr>
-            <p:ph type="ftr" sz="quarter" idx="12"/>
-          </p:nvPr>
-        </p:nvSpPr>
-        <p:spPr/>
-        <p:txBody>
-          <a:bodyPr/>
-          <a:lstStyle/>
-          <a:p>
-            <a:r>
-              <a:rPr lang="en-US" dirty="0" err="1"/>
-              <a:t>Xlink</a:t>
-            </a:r>
-            <a:r>
-              <a:rPr lang="en-US" dirty="0"/>
-              <a:t> | </a:t>
-            </a:r>
-            <a:r>
-              <a:rPr lang="en-US" dirty="0" err="1"/>
-              <a:t>DocBook</a:t>
-            </a:r>
-            <a:r>
-              <a:rPr lang="en-US" dirty="0"/>
-              <a:t> </a:t>
-            </a:r>
-            <a:r>
-              <a:rPr lang="en-US" dirty="0" err="1"/>
-              <a:t>Dokumentation</a:t>
-            </a:r>
-            <a:endParaRPr lang="en-US" dirty="0"/>
-          </a:p>
-        </p:txBody>
-      </p:sp>
-      <p:sp>
-        <p:nvSpPr>
-          <p:cNvPr id="3" name="Titel 2"/>
-          <p:cNvSpPr>
-            <a:spLocks noGrp="1"/>
-          </p:cNvSpPr>
-          <p:nvPr>
-            <p:ph type="title"/>
-          </p:nvPr>
-        </p:nvSpPr>
-        <p:spPr>
-          <a:xfrm>
-            <a:off x="319091" y="745751"/>
-            <a:ext cx="8508999" cy="307777"/>
-          </a:xfrm>
-          <a:prstGeom prst="rect">
-            <a:avLst/>
-          </a:prstGeom>
-        </p:spPr>
-        <p:txBody>
-          <a:bodyPr/>
-          <a:lstStyle/>
-          <a:p>
-            <a:pPr algn="ctr"/>
-            <a:r>
-              <a:rPr lang="de-DE" dirty="0" err="1"/>
-              <a:t>DocBook</a:t>
-            </a:r>
-            <a:endParaRPr lang="de-DE" dirty="0"/>
-          </a:p>
-        </p:txBody>
-      </p:sp>
-      <p:pic>
-        <p:nvPicPr>
-          <p:cNvPr id="5" name="Grafik 4">
-            <a:extLst>
-              <a:ext uri="{FF2B5EF4-FFF2-40B4-BE49-F238E27FC236}">
-                <a16:creationId xmlns:a16="http://schemas.microsoft.com/office/drawing/2014/main" id="{F34106F0-6CC1-7E45-A429-47EA60503F92}"/>
-              </a:ext>
-            </a:extLst>
-          </p:cNvPr>
-          <p:cNvPicPr>
-            <a:picLocks noChangeAspect="1"/>
-          </p:cNvPicPr>
-          <p:nvPr/>
-        </p:nvPicPr>
-        <p:blipFill>
-          <a:blip r:embed="rId2"/>
-          <a:stretch>
-            <a:fillRect/>
-          </a:stretch>
-        </p:blipFill>
-        <p:spPr>
-          <a:xfrm>
-            <a:off x="657230" y="1870980"/>
-            <a:ext cx="7829539" cy="1401539"/>
-          </a:xfrm>
-          <a:prstGeom prst="rect">
-            <a:avLst/>
-          </a:prstGeom>
-        </p:spPr>
-      </p:pic>
-    </p:spTree>
-    <p:extLst>
-      <p:ext uri="{BB962C8B-B14F-4D97-AF65-F5344CB8AC3E}">
-        <p14:creationId xmlns:p14="http://schemas.microsoft.com/office/powerpoint/2010/main" val="3674180149"/>
       </p:ext>
     </p:extLst>
   </p:cSld>

</xml_diff>